<commit_message>
Update Project Presentation Final.pptx
</commit_message>
<xml_diff>
--- a/Project Presentation Final.pptx
+++ b/Project Presentation Final.pptx
@@ -5,23 +5,24 @@
     <p:sldMasterId id="2147483648" r:id="rId1"/>
   </p:sldMasterIdLst>
   <p:notesMasterIdLst>
-    <p:notesMasterId r:id="rId16"/>
+    <p:notesMasterId r:id="rId17"/>
   </p:notesMasterIdLst>
   <p:sldIdLst>
     <p:sldId id="261" r:id="rId2"/>
-    <p:sldId id="268" r:id="rId3"/>
-    <p:sldId id="270" r:id="rId4"/>
-    <p:sldId id="269" r:id="rId5"/>
-    <p:sldId id="271" r:id="rId6"/>
-    <p:sldId id="272" r:id="rId7"/>
-    <p:sldId id="273" r:id="rId8"/>
-    <p:sldId id="274" r:id="rId9"/>
-    <p:sldId id="275" r:id="rId10"/>
-    <p:sldId id="276" r:id="rId11"/>
-    <p:sldId id="279" r:id="rId12"/>
-    <p:sldId id="277" r:id="rId13"/>
-    <p:sldId id="278" r:id="rId14"/>
-    <p:sldId id="280" r:id="rId15"/>
+    <p:sldId id="281" r:id="rId3"/>
+    <p:sldId id="268" r:id="rId4"/>
+    <p:sldId id="270" r:id="rId5"/>
+    <p:sldId id="269" r:id="rId6"/>
+    <p:sldId id="271" r:id="rId7"/>
+    <p:sldId id="272" r:id="rId8"/>
+    <p:sldId id="273" r:id="rId9"/>
+    <p:sldId id="274" r:id="rId10"/>
+    <p:sldId id="275" r:id="rId11"/>
+    <p:sldId id="276" r:id="rId12"/>
+    <p:sldId id="279" r:id="rId13"/>
+    <p:sldId id="277" r:id="rId14"/>
+    <p:sldId id="278" r:id="rId15"/>
+    <p:sldId id="280" r:id="rId16"/>
   </p:sldIdLst>
   <p:sldSz cx="12192000" cy="6858000"/>
   <p:notesSz cx="6858000" cy="9144000"/>
@@ -259,7 +260,7 @@
       <p15:sldGuideLst xmlns:p15="http://schemas.microsoft.com/office/powerpoint/2012/main"/>
     </p:ext>
     <p:ext uri="GoogleSlidesCustomDataVersion2">
-      <go:slidesCustomData xmlns:go="http://customooxmlschemas.google.com/" xmlns:ahyp="http://schemas.microsoft.com/office/drawing/2018/hyperlinkcolor" xmlns:p15="http://schemas.microsoft.com/office/powerpoint/2012/main" xmlns:p14="http://schemas.microsoft.com/office/powerpoint/2010/main" xmlns:com="http://schemas.openxmlformats.org/drawingml/2006/compatibility" xmlns:pvml="urn:schemas-microsoft-com:office:powerpoint" xmlns:v="urn:schemas-microsoft-com:vml" xmlns:o="urn:schemas-microsoft-com:office:office" xmlns:dgm="http://schemas.openxmlformats.org/drawingml/2006/diagram" xmlns:c="http://schemas.openxmlformats.org/drawingml/2006/chart" xmlns:mv="urn:schemas-microsoft-com:mac:vml" xmlns:mc="http://schemas.openxmlformats.org/markup-compatibility/2006" xmlns="" r:id="rId31" roundtripDataSignature="AMtx7mjOmBtk5DbvnkierGKxpb4ZbKw0WQ=="/>
+      <go:slidesCustomData xmlns="" xmlns:mc="http://schemas.openxmlformats.org/markup-compatibility/2006" xmlns:mv="urn:schemas-microsoft-com:mac:vml" xmlns:c="http://schemas.openxmlformats.org/drawingml/2006/chart" xmlns:dgm="http://schemas.openxmlformats.org/drawingml/2006/diagram" xmlns:o="urn:schemas-microsoft-com:office:office" xmlns:v="urn:schemas-microsoft-com:vml" xmlns:pvml="urn:schemas-microsoft-com:office:powerpoint" xmlns:com="http://schemas.openxmlformats.org/drawingml/2006/compatibility" xmlns:p14="http://schemas.microsoft.com/office/powerpoint/2010/main" xmlns:p15="http://schemas.microsoft.com/office/powerpoint/2012/main" xmlns:ahyp="http://schemas.microsoft.com/office/drawing/2018/hyperlinkcolor" xmlns:go="http://customooxmlschemas.google.com/" r:id="rId31" roundtripDataSignature="AMtx7mjOmBtk5DbvnkierGKxpb4ZbKw0WQ=="/>
     </p:ext>
   </p:extLst>
 </p:presentation>
@@ -1771,7 +1772,7 @@
                 <a:cs typeface="Calibri"/>
                 <a:sym typeface="Calibri"/>
               </a:rPr>
-              <a:t>11</a:t>
+              <a:t>12</a:t>
             </a:fld>
             <a:endParaRPr lang="en-US" sz="1200" b="0" i="0" u="none" strike="noStrike" cap="none">
               <a:solidFill>
@@ -3023,7 +3024,7 @@
                 <a:cs typeface="Calibri"/>
                 <a:sym typeface="Calibri"/>
               </a:rPr>
-              <a:t>8</a:t>
+              <a:t>9</a:t>
             </a:fld>
             <a:endParaRPr lang="en-US" sz="1200" b="0" i="0" u="none" strike="noStrike" cap="none">
               <a:solidFill>
@@ -14860,6 +14861,263 @@
   <p:cSld>
     <p:spTree>
       <p:nvGrpSpPr>
+        <p:cNvPr id="1" name="Shape 222">
+          <a:extLst>
+            <a:ext uri="{FF2B5EF4-FFF2-40B4-BE49-F238E27FC236}">
+              <a16:creationId xmlns:a16="http://schemas.microsoft.com/office/drawing/2014/main" id="{787A6A46-5DC0-8767-8438-C8D3644CCFDB}"/>
+            </a:ext>
+          </a:extLst>
+        </p:cNvPr>
+        <p:cNvGrpSpPr/>
+        <p:nvPr/>
+      </p:nvGrpSpPr>
+      <p:grpSpPr>
+        <a:xfrm>
+          <a:off x="0" y="0"/>
+          <a:ext cx="0" cy="0"/>
+          <a:chOff x="0" y="0"/>
+          <a:chExt cx="0" cy="0"/>
+        </a:xfrm>
+      </p:grpSpPr>
+      <p:sp>
+        <p:nvSpPr>
+          <p:cNvPr id="223" name="Google Shape;223;p12">
+            <a:extLst>
+              <a:ext uri="{FF2B5EF4-FFF2-40B4-BE49-F238E27FC236}">
+                <a16:creationId xmlns:a16="http://schemas.microsoft.com/office/drawing/2014/main" id="{3B32F424-EB5E-C94C-E85B-691A924AB880}"/>
+              </a:ext>
+            </a:extLst>
+          </p:cNvPr>
+          <p:cNvSpPr txBox="1">
+            <a:spLocks noGrp="1"/>
+          </p:cNvSpPr>
+          <p:nvPr>
+            <p:ph type="dt" idx="10"/>
+          </p:nvPr>
+        </p:nvSpPr>
+        <p:spPr>
+          <a:xfrm>
+            <a:off x="838200" y="6356350"/>
+            <a:ext cx="2743200" cy="365125"/>
+          </a:xfrm>
+          <a:prstGeom prst="rect">
+            <a:avLst/>
+          </a:prstGeom>
+          <a:noFill/>
+          <a:ln>
+            <a:noFill/>
+          </a:ln>
+        </p:spPr>
+        <p:txBody>
+          <a:bodyPr spcFirstLastPara="1" wrap="square" lIns="91425" tIns="45700" rIns="91425" bIns="45700" anchor="ctr" anchorCtr="0">
+            <a:noAutofit/>
+          </a:bodyPr>
+          <a:lstStyle/>
+          <a:p>
+            <a:fld id="{5C6A64CA-2458-4BBF-B194-6A98E858D607}" type="datetime1">
+              <a:rPr lang="en-US" smtClean="0"/>
+              <a:pPr/>
+              <a:t>11/27/2025</a:t>
+            </a:fld>
+            <a:endParaRPr lang="en-US" dirty="0"/>
+          </a:p>
+        </p:txBody>
+      </p:sp>
+      <p:sp>
+        <p:nvSpPr>
+          <p:cNvPr id="224" name="Google Shape;224;p12">
+            <a:extLst>
+              <a:ext uri="{FF2B5EF4-FFF2-40B4-BE49-F238E27FC236}">
+                <a16:creationId xmlns:a16="http://schemas.microsoft.com/office/drawing/2014/main" id="{C27F4A1F-EBEB-14C0-9024-C65867B7CB77}"/>
+              </a:ext>
+            </a:extLst>
+          </p:cNvPr>
+          <p:cNvSpPr txBox="1">
+            <a:spLocks noGrp="1"/>
+          </p:cNvSpPr>
+          <p:nvPr>
+            <p:ph type="ftr" idx="11"/>
+          </p:nvPr>
+        </p:nvSpPr>
+        <p:spPr>
+          <a:xfrm>
+            <a:off x="3880338" y="6356350"/>
+            <a:ext cx="4273062" cy="365125"/>
+          </a:xfrm>
+          <a:prstGeom prst="rect">
+            <a:avLst/>
+          </a:prstGeom>
+          <a:noFill/>
+          <a:ln>
+            <a:noFill/>
+          </a:ln>
+        </p:spPr>
+        <p:txBody>
+          <a:bodyPr spcFirstLastPara="1" wrap="square" lIns="91425" tIns="45700" rIns="91425" bIns="45700" anchor="ctr" anchorCtr="0">
+            <a:noAutofit/>
+          </a:bodyPr>
+          <a:lstStyle/>
+          <a:p>
+            <a:r>
+              <a:rPr lang="en-US" dirty="0" err="1"/>
+              <a:t>DetactaX</a:t>
+            </a:r>
+            <a:r>
+              <a:rPr lang="en-US" dirty="0"/>
+              <a:t> – Image Classification &amp; Object Recognition Reimagined.</a:t>
+            </a:r>
+          </a:p>
+          <a:p>
+            <a:pPr marL="0" lvl="0" indent="0" algn="ctr" rtl="0">
+              <a:spcBef>
+                <a:spcPts val="0"/>
+              </a:spcBef>
+              <a:spcAft>
+                <a:spcPts val="0"/>
+              </a:spcAft>
+              <a:buNone/>
+            </a:pPr>
+            <a:endParaRPr dirty="0"/>
+          </a:p>
+        </p:txBody>
+      </p:sp>
+      <p:sp>
+        <p:nvSpPr>
+          <p:cNvPr id="225" name="Google Shape;225;p12">
+            <a:extLst>
+              <a:ext uri="{FF2B5EF4-FFF2-40B4-BE49-F238E27FC236}">
+                <a16:creationId xmlns:a16="http://schemas.microsoft.com/office/drawing/2014/main" id="{47C4ABE2-07EE-F06C-C9C5-A43BBDDE30D5}"/>
+              </a:ext>
+            </a:extLst>
+          </p:cNvPr>
+          <p:cNvSpPr txBox="1">
+            <a:spLocks noGrp="1"/>
+          </p:cNvSpPr>
+          <p:nvPr>
+            <p:ph type="sldNum" idx="12"/>
+          </p:nvPr>
+        </p:nvSpPr>
+        <p:spPr>
+          <a:xfrm>
+            <a:off x="8610600" y="6356350"/>
+            <a:ext cx="2743200" cy="365125"/>
+          </a:xfrm>
+          <a:prstGeom prst="rect">
+            <a:avLst/>
+          </a:prstGeom>
+          <a:noFill/>
+          <a:ln>
+            <a:noFill/>
+          </a:ln>
+        </p:spPr>
+        <p:txBody>
+          <a:bodyPr spcFirstLastPara="1" wrap="square" lIns="91425" tIns="45700" rIns="91425" bIns="45700" anchor="ctr" anchorCtr="0">
+            <a:noAutofit/>
+          </a:bodyPr>
+          <a:lstStyle/>
+          <a:p>
+            <a:pPr marL="0" lvl="0" indent="0" algn="r" rtl="0">
+              <a:spcBef>
+                <a:spcPts val="0"/>
+              </a:spcBef>
+              <a:spcAft>
+                <a:spcPts val="0"/>
+              </a:spcAft>
+              <a:buNone/>
+            </a:pPr>
+            <a:fld id="{00000000-1234-1234-1234-123412341234}" type="slidenum">
+              <a:rPr lang="en-US"/>
+              <a:t>10</a:t>
+            </a:fld>
+            <a:endParaRPr/>
+          </a:p>
+        </p:txBody>
+      </p:sp>
+      <p:pic>
+        <p:nvPicPr>
+          <p:cNvPr id="2" name="Picture 1" descr="A blue text on a black background&#10;&#10;AI-generated content may be incorrect.">
+            <a:extLst>
+              <a:ext uri="{FF2B5EF4-FFF2-40B4-BE49-F238E27FC236}">
+                <a16:creationId xmlns:a16="http://schemas.microsoft.com/office/drawing/2014/main" id="{FA33A959-88CF-E665-6C1F-0BCE25E106F2}"/>
+              </a:ext>
+            </a:extLst>
+          </p:cNvPr>
+          <p:cNvPicPr>
+            <a:picLocks noChangeAspect="1"/>
+          </p:cNvPicPr>
+          <p:nvPr/>
+        </p:nvPicPr>
+        <p:blipFill>
+          <a:blip r:embed="rId3"/>
+          <a:stretch>
+            <a:fillRect/>
+          </a:stretch>
+        </p:blipFill>
+        <p:spPr>
+          <a:xfrm>
+            <a:off x="9156273" y="6347222"/>
+            <a:ext cx="1475520" cy="383380"/>
+          </a:xfrm>
+          <a:prstGeom prst="rect">
+            <a:avLst/>
+          </a:prstGeom>
+        </p:spPr>
+      </p:pic>
+      <p:sp>
+        <p:nvSpPr>
+          <p:cNvPr id="4" name="TextBox 3">
+            <a:extLst>
+              <a:ext uri="{FF2B5EF4-FFF2-40B4-BE49-F238E27FC236}">
+                <a16:creationId xmlns:a16="http://schemas.microsoft.com/office/drawing/2014/main" id="{26B59374-E0D6-423C-A813-08E86A08C421}"/>
+              </a:ext>
+            </a:extLst>
+          </p:cNvPr>
+          <p:cNvSpPr txBox="1"/>
+          <p:nvPr/>
+        </p:nvSpPr>
+        <p:spPr>
+          <a:xfrm>
+            <a:off x="838200" y="3275111"/>
+            <a:ext cx="10515600" cy="707886"/>
+          </a:xfrm>
+          <a:prstGeom prst="rect">
+            <a:avLst/>
+          </a:prstGeom>
+          <a:noFill/>
+        </p:spPr>
+        <p:txBody>
+          <a:bodyPr wrap="square" rtlCol="0">
+            <a:spAutoFit/>
+          </a:bodyPr>
+          <a:lstStyle/>
+          <a:p>
+            <a:pPr algn="ctr"/>
+            <a:r>
+              <a:rPr lang="en-US" sz="4000" b="1" dirty="0" err="1"/>
+              <a:t>Mlflow</a:t>
+            </a:r>
+            <a:endParaRPr lang="en-US" sz="4000" b="1" dirty="0"/>
+          </a:p>
+        </p:txBody>
+      </p:sp>
+    </p:spTree>
+    <p:extLst>
+      <p:ext uri="{BB962C8B-B14F-4D97-AF65-F5344CB8AC3E}">
+        <p14:creationId xmlns:p14="http://schemas.microsoft.com/office/powerpoint/2010/main" val="1430579263"/>
+      </p:ext>
+    </p:extLst>
+  </p:cSld>
+  <p:clrMapOvr>
+    <a:masterClrMapping/>
+  </p:clrMapOvr>
+</p:sld>
+</file>
+
+<file path=ppt/slides/slide11.xml><?xml version="1.0" encoding="utf-8"?>
+<p:sld xmlns:a="http://schemas.openxmlformats.org/drawingml/2006/main" xmlns:r="http://schemas.openxmlformats.org/officeDocument/2006/relationships" xmlns:p="http://schemas.openxmlformats.org/presentationml/2006/main">
+  <p:cSld>
+    <p:spTree>
+      <p:nvGrpSpPr>
         <p:cNvPr id="1" name="Shape 213">
           <a:extLst>
             <a:ext uri="{FF2B5EF4-FFF2-40B4-BE49-F238E27FC236}">
@@ -15102,7 +15360,7 @@
             </a:pPr>
             <a:fld id="{00000000-1234-1234-1234-123412341234}" type="slidenum">
               <a:rPr lang="en-US"/>
-              <a:t>10</a:t>
+              <a:t>11</a:t>
             </a:fld>
             <a:endParaRPr/>
           </a:p>
@@ -15194,7 +15452,7 @@
 </p:sld>
 </file>
 
-<file path=ppt/slides/slide11.xml><?xml version="1.0" encoding="utf-8"?>
+<file path=ppt/slides/slide12.xml><?xml version="1.0" encoding="utf-8"?>
 <p:sld xmlns:a="http://schemas.openxmlformats.org/drawingml/2006/main" xmlns:r="http://schemas.openxmlformats.org/officeDocument/2006/relationships" xmlns:p="http://schemas.openxmlformats.org/presentationml/2006/main">
   <p:cSld>
     <p:spTree>
@@ -15480,7 +15738,7 @@
 </p:sld>
 </file>
 
-<file path=ppt/slides/slide12.xml><?xml version="1.0" encoding="utf-8"?>
+<file path=ppt/slides/slide13.xml><?xml version="1.0" encoding="utf-8"?>
 <p:sld xmlns:a="http://schemas.openxmlformats.org/drawingml/2006/main" xmlns:r="http://schemas.openxmlformats.org/officeDocument/2006/relationships" xmlns:p="http://schemas.openxmlformats.org/presentationml/2006/main">
   <p:cSld>
     <p:spTree>
@@ -15651,7 +15909,7 @@
             </a:pPr>
             <a:fld id="{00000000-1234-1234-1234-123412341234}" type="slidenum">
               <a:rPr lang="en-US"/>
-              <a:t>12</a:t>
+              <a:t>13</a:t>
             </a:fld>
             <a:endParaRPr/>
           </a:p>
@@ -15736,7 +15994,7 @@
 </p:sld>
 </file>
 
-<file path=ppt/slides/slide13.xml><?xml version="1.0" encoding="utf-8"?>
+<file path=ppt/slides/slide14.xml><?xml version="1.0" encoding="utf-8"?>
 <p:sld xmlns:a="http://schemas.openxmlformats.org/drawingml/2006/main" xmlns:r="http://schemas.openxmlformats.org/officeDocument/2006/relationships" xmlns:p="http://schemas.openxmlformats.org/presentationml/2006/main">
   <p:cSld>
     <p:spTree>
@@ -15908,7 +16166,7 @@
             </a:pPr>
             <a:fld id="{00000000-1234-1234-1234-123412341234}" type="slidenum">
               <a:rPr lang="en-US"/>
-              <a:t>13</a:t>
+              <a:t>14</a:t>
             </a:fld>
             <a:endParaRPr/>
           </a:p>
@@ -15993,7 +16251,7 @@
 </p:sld>
 </file>
 
-<file path=ppt/slides/slide14.xml><?xml version="1.0" encoding="utf-8"?>
+<file path=ppt/slides/slide15.xml><?xml version="1.0" encoding="utf-8"?>
 <p:sld xmlns:a="http://schemas.openxmlformats.org/drawingml/2006/main" xmlns:r="http://schemas.openxmlformats.org/officeDocument/2006/relationships" xmlns:p="http://schemas.openxmlformats.org/presentationml/2006/main">
   <p:cSld>
     <p:spTree>
@@ -16164,7 +16422,7 @@
             </a:pPr>
             <a:fld id="{00000000-1234-1234-1234-123412341234}" type="slidenum">
               <a:rPr lang="en-US"/>
-              <a:t>14</a:t>
+              <a:t>15</a:t>
             </a:fld>
             <a:endParaRPr/>
           </a:p>
@@ -16250,6 +16508,311 @@
 </file>
 
 <file path=ppt/slides/slide2.xml><?xml version="1.0" encoding="utf-8"?>
+<p:sld xmlns:a="http://schemas.openxmlformats.org/drawingml/2006/main" xmlns:r="http://schemas.openxmlformats.org/officeDocument/2006/relationships" xmlns:p="http://schemas.openxmlformats.org/presentationml/2006/main">
+  <p:cSld>
+    <p:spTree>
+      <p:nvGrpSpPr>
+        <p:cNvPr id="1" name=""/>
+        <p:cNvGrpSpPr/>
+        <p:nvPr/>
+      </p:nvGrpSpPr>
+      <p:grpSpPr>
+        <a:xfrm>
+          <a:off x="0" y="0"/>
+          <a:ext cx="0" cy="0"/>
+          <a:chOff x="0" y="0"/>
+          <a:chExt cx="0" cy="0"/>
+        </a:xfrm>
+      </p:grpSpPr>
+      <p:sp>
+        <p:nvSpPr>
+          <p:cNvPr id="2" name="Title 1">
+            <a:extLst>
+              <a:ext uri="{FF2B5EF4-FFF2-40B4-BE49-F238E27FC236}">
+                <a16:creationId xmlns:a16="http://schemas.microsoft.com/office/drawing/2014/main" id="{2E92CE6C-DDEF-5C8A-D6CC-2DD87CB6FE6E}"/>
+              </a:ext>
+            </a:extLst>
+          </p:cNvPr>
+          <p:cNvSpPr>
+            <a:spLocks noGrp="1"/>
+          </p:cNvSpPr>
+          <p:nvPr>
+            <p:ph type="title"/>
+          </p:nvPr>
+        </p:nvSpPr>
+        <p:spPr>
+          <a:xfrm>
+            <a:off x="838200" y="1005840"/>
+            <a:ext cx="10515600" cy="684848"/>
+          </a:xfrm>
+        </p:spPr>
+        <p:txBody>
+          <a:bodyPr wrap="square" anchor="ctr">
+            <a:normAutofit fontScale="90000"/>
+          </a:bodyPr>
+          <a:lstStyle/>
+          <a:p>
+            <a:r>
+              <a:rPr lang="en-US" dirty="0"/>
+              <a:t>Project team:</a:t>
+            </a:r>
+          </a:p>
+        </p:txBody>
+      </p:sp>
+      <p:sp>
+        <p:nvSpPr>
+          <p:cNvPr id="4" name="Slide Number Placeholder 3">
+            <a:extLst>
+              <a:ext uri="{FF2B5EF4-FFF2-40B4-BE49-F238E27FC236}">
+                <a16:creationId xmlns:a16="http://schemas.microsoft.com/office/drawing/2014/main" id="{B91E7D9E-648A-42CD-0DF3-2CEAE0F58F0A}"/>
+              </a:ext>
+            </a:extLst>
+          </p:cNvPr>
+          <p:cNvSpPr>
+            <a:spLocks noGrp="1"/>
+          </p:cNvSpPr>
+          <p:nvPr>
+            <p:ph type="sldNum" idx="12"/>
+          </p:nvPr>
+        </p:nvSpPr>
+        <p:spPr>
+          <a:xfrm>
+            <a:off x="8610600" y="6356350"/>
+            <a:ext cx="2743200" cy="365125"/>
+          </a:xfrm>
+        </p:spPr>
+        <p:txBody>
+          <a:bodyPr wrap="square" anchor="ctr">
+            <a:normAutofit/>
+          </a:bodyPr>
+          <a:lstStyle/>
+          <a:p>
+            <a:pPr marL="0" lvl="0" indent="0" rtl="0">
+              <a:spcBef>
+                <a:spcPts val="0"/>
+              </a:spcBef>
+              <a:spcAft>
+                <a:spcPts val="600"/>
+              </a:spcAft>
+              <a:buNone/>
+            </a:pPr>
+            <a:fld id="{00000000-1234-1234-1234-123412341234}" type="slidenum">
+              <a:rPr lang="en-US" smtClean="0"/>
+              <a:pPr marL="0" lvl="0" indent="0" rtl="0">
+                <a:spcBef>
+                  <a:spcPts val="0"/>
+                </a:spcBef>
+                <a:spcAft>
+                  <a:spcPts val="600"/>
+                </a:spcAft>
+                <a:buNone/>
+              </a:pPr>
+              <a:t>2</a:t>
+            </a:fld>
+            <a:endParaRPr lang="en-US"/>
+          </a:p>
+        </p:txBody>
+      </p:sp>
+      <p:sp>
+        <p:nvSpPr>
+          <p:cNvPr id="3" name="Text Placeholder 2">
+            <a:extLst>
+              <a:ext uri="{FF2B5EF4-FFF2-40B4-BE49-F238E27FC236}">
+                <a16:creationId xmlns:a16="http://schemas.microsoft.com/office/drawing/2014/main" id="{770D6E84-8CEF-2DF9-9E6B-D3C90D334549}"/>
+              </a:ext>
+            </a:extLst>
+          </p:cNvPr>
+          <p:cNvSpPr>
+            <a:spLocks noGrp="1"/>
+          </p:cNvSpPr>
+          <p:nvPr>
+            <p:ph type="body" idx="4294967295"/>
+          </p:nvPr>
+        </p:nvSpPr>
+        <p:spPr>
+          <a:xfrm>
+            <a:off x="838200" y="1881188"/>
+            <a:ext cx="7094220" cy="4352544"/>
+          </a:xfrm>
+        </p:spPr>
+        <p:txBody>
+          <a:bodyPr anchor="t">
+            <a:normAutofit/>
+          </a:bodyPr>
+          <a:lstStyle/>
+          <a:p>
+            <a:pPr>
+              <a:spcBef>
+                <a:spcPts val="0"/>
+              </a:spcBef>
+              <a:spcAft>
+                <a:spcPts val="600"/>
+              </a:spcAft>
+              <a:buClr>
+                <a:srgbClr val="000000"/>
+              </a:buClr>
+            </a:pPr>
+            <a:r>
+              <a:rPr lang="en-US" sz="2400" b="0" i="0" u="none" strike="noStrike" cap="none"/>
+              <a:t>Zyad Gamal (team leader): Azure Integration &amp; API Deployment.</a:t>
+            </a:r>
+          </a:p>
+          <a:p>
+            <a:pPr>
+              <a:spcBef>
+                <a:spcPts val="0"/>
+              </a:spcBef>
+              <a:spcAft>
+                <a:spcPts val="600"/>
+              </a:spcAft>
+              <a:buClr>
+                <a:srgbClr val="000000"/>
+              </a:buClr>
+            </a:pPr>
+            <a:r>
+              <a:rPr lang="en-US" sz="2400" b="0" i="0" u="none" strike="noStrike" cap="none"/>
+              <a:t>Basel Mohamed Mostafa: Classification Model structure &amp; Training, Mlflow, and Project Documentation.</a:t>
+            </a:r>
+          </a:p>
+          <a:p>
+            <a:pPr>
+              <a:spcBef>
+                <a:spcPts val="0"/>
+              </a:spcBef>
+              <a:spcAft>
+                <a:spcPts val="600"/>
+              </a:spcAft>
+              <a:buClr>
+                <a:srgbClr val="000000"/>
+              </a:buClr>
+            </a:pPr>
+            <a:r>
+              <a:rPr lang="en-US" sz="2400" b="0" i="0" u="none" strike="noStrike" cap="none"/>
+              <a:t>Omar Yasser: Project Models Interface GUI using Streamlit.</a:t>
+            </a:r>
+          </a:p>
+          <a:p>
+            <a:pPr>
+              <a:spcBef>
+                <a:spcPts val="0"/>
+              </a:spcBef>
+              <a:spcAft>
+                <a:spcPts val="600"/>
+              </a:spcAft>
+              <a:buClr>
+                <a:srgbClr val="000000"/>
+              </a:buClr>
+            </a:pPr>
+            <a:r>
+              <a:rPr lang="en-US" sz="2400" b="0" i="0" u="none" strike="noStrike" cap="none"/>
+              <a:t>Mohamed Elfouly: Object Recognition Model.</a:t>
+            </a:r>
+          </a:p>
+          <a:p>
+            <a:pPr>
+              <a:spcBef>
+                <a:spcPts val="0"/>
+              </a:spcBef>
+              <a:spcAft>
+                <a:spcPts val="600"/>
+              </a:spcAft>
+              <a:buClr>
+                <a:srgbClr val="000000"/>
+              </a:buClr>
+            </a:pPr>
+            <a:r>
+              <a:rPr lang="en-US" sz="2400" b="0" i="0" u="none" strike="noStrike" cap="none"/>
+              <a:t>Zyad Ahmed: Dataset Acquistion &amp; Augmentations.</a:t>
+            </a:r>
+          </a:p>
+          <a:p>
+            <a:pPr>
+              <a:spcBef>
+                <a:spcPts val="0"/>
+              </a:spcBef>
+              <a:spcAft>
+                <a:spcPts val="600"/>
+              </a:spcAft>
+              <a:buClr>
+                <a:srgbClr val="000000"/>
+              </a:buClr>
+            </a:pPr>
+            <a:r>
+              <a:rPr lang="en-US" sz="2400" b="0" i="0" u="none" strike="noStrike" cap="none"/>
+              <a:t>Abdulrahman: Classification Model Transfer Learning.</a:t>
+            </a:r>
+          </a:p>
+          <a:p>
+            <a:pPr>
+              <a:spcBef>
+                <a:spcPts val="0"/>
+              </a:spcBef>
+              <a:spcAft>
+                <a:spcPts val="600"/>
+              </a:spcAft>
+              <a:buClr>
+                <a:srgbClr val="000000"/>
+              </a:buClr>
+            </a:pPr>
+            <a:endParaRPr lang="en-US" sz="2400" b="0" i="0" u="none" strike="noStrike" cap="none"/>
+          </a:p>
+        </p:txBody>
+      </p:sp>
+      <p:pic>
+        <p:nvPicPr>
+          <p:cNvPr id="5" name="Picture 4" descr="A logo of a bird with a magnifying glass&#10;&#10;AI-generated content may be incorrect.">
+            <a:extLst>
+              <a:ext uri="{FF2B5EF4-FFF2-40B4-BE49-F238E27FC236}">
+                <a16:creationId xmlns:a16="http://schemas.microsoft.com/office/drawing/2014/main" id="{5C4DE48E-784A-3CBA-CD49-6547579CE3F4}"/>
+              </a:ext>
+            </a:extLst>
+          </p:cNvPr>
+          <p:cNvPicPr>
+            <a:picLocks noChangeAspect="1"/>
+          </p:cNvPicPr>
+          <p:nvPr/>
+        </p:nvPicPr>
+        <p:blipFill>
+          <a:blip r:embed="rId2">
+            <a:extLst>
+              <a:ext uri="{28A0092B-C50C-407E-A947-70E740481C1C}">
+                <a14:useLocalDpi xmlns:a14="http://schemas.microsoft.com/office/drawing/2010/main" val="0"/>
+              </a:ext>
+            </a:extLst>
+          </a:blip>
+          <a:srcRect l="15625" r="14520" b="-3"/>
+          <a:stretch>
+            <a:fillRect/>
+          </a:stretch>
+        </p:blipFill>
+        <p:spPr>
+          <a:xfrm>
+            <a:off x="8313420" y="1881188"/>
+            <a:ext cx="3040379" cy="4352544"/>
+          </a:xfrm>
+          <a:prstGeom prst="rect">
+            <a:avLst/>
+          </a:prstGeom>
+          <a:noFill/>
+          <a:ln>
+            <a:noFill/>
+          </a:ln>
+        </p:spPr>
+      </p:pic>
+    </p:spTree>
+    <p:extLst>
+      <p:ext uri="{BB962C8B-B14F-4D97-AF65-F5344CB8AC3E}">
+        <p14:creationId xmlns:p14="http://schemas.microsoft.com/office/powerpoint/2010/main" val="3894007029"/>
+      </p:ext>
+    </p:extLst>
+  </p:cSld>
+  <p:clrMapOvr>
+    <a:masterClrMapping/>
+  </p:clrMapOvr>
+</p:sld>
+</file>
+
+<file path=ppt/slides/slide3.xml><?xml version="1.0" encoding="utf-8"?>
 <p:sld xmlns:a="http://schemas.openxmlformats.org/drawingml/2006/main" xmlns:r="http://schemas.openxmlformats.org/officeDocument/2006/relationships" xmlns:p="http://schemas.openxmlformats.org/presentationml/2006/main">
   <p:cSld>
     <p:spTree>
@@ -16647,7 +17210,7 @@
             </a:pPr>
             <a:fld id="{00000000-1234-1234-1234-123412341234}" type="slidenum">
               <a:rPr lang="en-US"/>
-              <a:t>2</a:t>
+              <a:t>3</a:t>
             </a:fld>
             <a:endParaRPr/>
           </a:p>
@@ -16731,7 +17294,7 @@
 </p:sld>
 </file>
 
-<file path=ppt/slides/slide3.xml><?xml version="1.0" encoding="utf-8"?>
+<file path=ppt/slides/slide4.xml><?xml version="1.0" encoding="utf-8"?>
 <p:sld xmlns:a="http://schemas.openxmlformats.org/drawingml/2006/main" xmlns:r="http://schemas.openxmlformats.org/officeDocument/2006/relationships" xmlns:p="http://schemas.openxmlformats.org/presentationml/2006/main">
   <p:cSld>
     <p:spTree>
@@ -16902,7 +17465,7 @@
             </a:pPr>
             <a:fld id="{00000000-1234-1234-1234-123412341234}" type="slidenum">
               <a:rPr lang="en-US"/>
-              <a:t>3</a:t>
+              <a:t>4</a:t>
             </a:fld>
             <a:endParaRPr/>
           </a:p>
@@ -16987,7 +17550,7 @@
 </p:sld>
 </file>
 
-<file path=ppt/slides/slide4.xml><?xml version="1.0" encoding="utf-8"?>
+<file path=ppt/slides/slide5.xml><?xml version="1.0" encoding="utf-8"?>
 <p:sld xmlns:a="http://schemas.openxmlformats.org/drawingml/2006/main" xmlns:r="http://schemas.openxmlformats.org/officeDocument/2006/relationships" xmlns:p="http://schemas.openxmlformats.org/presentationml/2006/main">
   <p:cSld>
     <p:spTree>
@@ -17295,7 +17858,7 @@
             </a:pPr>
             <a:fld id="{00000000-1234-1234-1234-123412341234}" type="slidenum">
               <a:rPr lang="en-US"/>
-              <a:t>4</a:t>
+              <a:t>5</a:t>
             </a:fld>
             <a:endParaRPr/>
           </a:p>
@@ -17486,7 +18049,7 @@
 </p:sld>
 </file>
 
-<file path=ppt/slides/slide5.xml><?xml version="1.0" encoding="utf-8"?>
+<file path=ppt/slides/slide6.xml><?xml version="1.0" encoding="utf-8"?>
 <p:sld xmlns:a="http://schemas.openxmlformats.org/drawingml/2006/main" xmlns:r="http://schemas.openxmlformats.org/officeDocument/2006/relationships" xmlns:p="http://schemas.openxmlformats.org/presentationml/2006/main">
   <p:cSld>
     <p:spTree>
@@ -17657,7 +18220,7 @@
             </a:pPr>
             <a:fld id="{00000000-1234-1234-1234-123412341234}" type="slidenum">
               <a:rPr lang="en-US"/>
-              <a:t>5</a:t>
+              <a:t>6</a:t>
             </a:fld>
             <a:endParaRPr/>
           </a:p>
@@ -17771,7 +18334,7 @@
 </p:sld>
 </file>
 
-<file path=ppt/slides/slide6.xml><?xml version="1.0" encoding="utf-8"?>
+<file path=ppt/slides/slide7.xml><?xml version="1.0" encoding="utf-8"?>
 <p:sld xmlns:a="http://schemas.openxmlformats.org/drawingml/2006/main" xmlns:r="http://schemas.openxmlformats.org/officeDocument/2006/relationships" xmlns:p="http://schemas.openxmlformats.org/presentationml/2006/main">
   <p:cSld>
     <p:spTree>
@@ -18243,7 +18806,7 @@
             </a:pPr>
             <a:fld id="{00000000-1234-1234-1234-123412341234}" type="slidenum">
               <a:rPr lang="en-US"/>
-              <a:t>6</a:t>
+              <a:t>7</a:t>
             </a:fld>
             <a:endParaRPr/>
           </a:p>
@@ -18327,7 +18890,7 @@
 </p:sld>
 </file>
 
-<file path=ppt/slides/slide7.xml><?xml version="1.0" encoding="utf-8"?>
+<file path=ppt/slides/slide8.xml><?xml version="1.0" encoding="utf-8"?>
 <p:sld xmlns:a="http://schemas.openxmlformats.org/drawingml/2006/main" xmlns:r="http://schemas.openxmlformats.org/officeDocument/2006/relationships" xmlns:p="http://schemas.openxmlformats.org/presentationml/2006/main">
   <p:cSld>
     <p:spTree>
@@ -18593,7 +19156,7 @@
             </a:pPr>
             <a:fld id="{00000000-1234-1234-1234-123412341234}" type="slidenum">
               <a:rPr lang="en-US"/>
-              <a:t>7</a:t>
+              <a:t>8</a:t>
             </a:fld>
             <a:endParaRPr/>
           </a:p>
@@ -18677,7 +19240,7 @@
 </p:sld>
 </file>
 
-<file path=ppt/slides/slide8.xml><?xml version="1.0" encoding="utf-8"?>
+<file path=ppt/slides/slide9.xml><?xml version="1.0" encoding="utf-8"?>
 <p:sld xmlns:a="http://schemas.openxmlformats.org/drawingml/2006/main" xmlns:r="http://schemas.openxmlformats.org/officeDocument/2006/relationships" xmlns:p="http://schemas.openxmlformats.org/presentationml/2006/main">
   <p:cSld>
     <p:spTree>
@@ -19793,263 +20356,6 @@
 </p:sld>
 </file>
 
-<file path=ppt/slides/slide9.xml><?xml version="1.0" encoding="utf-8"?>
-<p:sld xmlns:a="http://schemas.openxmlformats.org/drawingml/2006/main" xmlns:r="http://schemas.openxmlformats.org/officeDocument/2006/relationships" xmlns:p="http://schemas.openxmlformats.org/presentationml/2006/main">
-  <p:cSld>
-    <p:spTree>
-      <p:nvGrpSpPr>
-        <p:cNvPr id="1" name="Shape 222">
-          <a:extLst>
-            <a:ext uri="{FF2B5EF4-FFF2-40B4-BE49-F238E27FC236}">
-              <a16:creationId xmlns:a16="http://schemas.microsoft.com/office/drawing/2014/main" id="{787A6A46-5DC0-8767-8438-C8D3644CCFDB}"/>
-            </a:ext>
-          </a:extLst>
-        </p:cNvPr>
-        <p:cNvGrpSpPr/>
-        <p:nvPr/>
-      </p:nvGrpSpPr>
-      <p:grpSpPr>
-        <a:xfrm>
-          <a:off x="0" y="0"/>
-          <a:ext cx="0" cy="0"/>
-          <a:chOff x="0" y="0"/>
-          <a:chExt cx="0" cy="0"/>
-        </a:xfrm>
-      </p:grpSpPr>
-      <p:sp>
-        <p:nvSpPr>
-          <p:cNvPr id="223" name="Google Shape;223;p12">
-            <a:extLst>
-              <a:ext uri="{FF2B5EF4-FFF2-40B4-BE49-F238E27FC236}">
-                <a16:creationId xmlns:a16="http://schemas.microsoft.com/office/drawing/2014/main" id="{3B32F424-EB5E-C94C-E85B-691A924AB880}"/>
-              </a:ext>
-            </a:extLst>
-          </p:cNvPr>
-          <p:cNvSpPr txBox="1">
-            <a:spLocks noGrp="1"/>
-          </p:cNvSpPr>
-          <p:nvPr>
-            <p:ph type="dt" idx="10"/>
-          </p:nvPr>
-        </p:nvSpPr>
-        <p:spPr>
-          <a:xfrm>
-            <a:off x="838200" y="6356350"/>
-            <a:ext cx="2743200" cy="365125"/>
-          </a:xfrm>
-          <a:prstGeom prst="rect">
-            <a:avLst/>
-          </a:prstGeom>
-          <a:noFill/>
-          <a:ln>
-            <a:noFill/>
-          </a:ln>
-        </p:spPr>
-        <p:txBody>
-          <a:bodyPr spcFirstLastPara="1" wrap="square" lIns="91425" tIns="45700" rIns="91425" bIns="45700" anchor="ctr" anchorCtr="0">
-            <a:noAutofit/>
-          </a:bodyPr>
-          <a:lstStyle/>
-          <a:p>
-            <a:fld id="{5C6A64CA-2458-4BBF-B194-6A98E858D607}" type="datetime1">
-              <a:rPr lang="en-US" smtClean="0"/>
-              <a:pPr/>
-              <a:t>11/27/2025</a:t>
-            </a:fld>
-            <a:endParaRPr lang="en-US" dirty="0"/>
-          </a:p>
-        </p:txBody>
-      </p:sp>
-      <p:sp>
-        <p:nvSpPr>
-          <p:cNvPr id="224" name="Google Shape;224;p12">
-            <a:extLst>
-              <a:ext uri="{FF2B5EF4-FFF2-40B4-BE49-F238E27FC236}">
-                <a16:creationId xmlns:a16="http://schemas.microsoft.com/office/drawing/2014/main" id="{C27F4A1F-EBEB-14C0-9024-C65867B7CB77}"/>
-              </a:ext>
-            </a:extLst>
-          </p:cNvPr>
-          <p:cNvSpPr txBox="1">
-            <a:spLocks noGrp="1"/>
-          </p:cNvSpPr>
-          <p:nvPr>
-            <p:ph type="ftr" idx="11"/>
-          </p:nvPr>
-        </p:nvSpPr>
-        <p:spPr>
-          <a:xfrm>
-            <a:off x="3880338" y="6356350"/>
-            <a:ext cx="4273062" cy="365125"/>
-          </a:xfrm>
-          <a:prstGeom prst="rect">
-            <a:avLst/>
-          </a:prstGeom>
-          <a:noFill/>
-          <a:ln>
-            <a:noFill/>
-          </a:ln>
-        </p:spPr>
-        <p:txBody>
-          <a:bodyPr spcFirstLastPara="1" wrap="square" lIns="91425" tIns="45700" rIns="91425" bIns="45700" anchor="ctr" anchorCtr="0">
-            <a:noAutofit/>
-          </a:bodyPr>
-          <a:lstStyle/>
-          <a:p>
-            <a:r>
-              <a:rPr lang="en-US" dirty="0" err="1"/>
-              <a:t>DetactaX</a:t>
-            </a:r>
-            <a:r>
-              <a:rPr lang="en-US" dirty="0"/>
-              <a:t> – Image Classification &amp; Object Recognition Reimagined.</a:t>
-            </a:r>
-          </a:p>
-          <a:p>
-            <a:pPr marL="0" lvl="0" indent="0" algn="ctr" rtl="0">
-              <a:spcBef>
-                <a:spcPts val="0"/>
-              </a:spcBef>
-              <a:spcAft>
-                <a:spcPts val="0"/>
-              </a:spcAft>
-              <a:buNone/>
-            </a:pPr>
-            <a:endParaRPr dirty="0"/>
-          </a:p>
-        </p:txBody>
-      </p:sp>
-      <p:sp>
-        <p:nvSpPr>
-          <p:cNvPr id="225" name="Google Shape;225;p12">
-            <a:extLst>
-              <a:ext uri="{FF2B5EF4-FFF2-40B4-BE49-F238E27FC236}">
-                <a16:creationId xmlns:a16="http://schemas.microsoft.com/office/drawing/2014/main" id="{47C4ABE2-07EE-F06C-C9C5-A43BBDDE30D5}"/>
-              </a:ext>
-            </a:extLst>
-          </p:cNvPr>
-          <p:cNvSpPr txBox="1">
-            <a:spLocks noGrp="1"/>
-          </p:cNvSpPr>
-          <p:nvPr>
-            <p:ph type="sldNum" idx="12"/>
-          </p:nvPr>
-        </p:nvSpPr>
-        <p:spPr>
-          <a:xfrm>
-            <a:off x="8610600" y="6356350"/>
-            <a:ext cx="2743200" cy="365125"/>
-          </a:xfrm>
-          <a:prstGeom prst="rect">
-            <a:avLst/>
-          </a:prstGeom>
-          <a:noFill/>
-          <a:ln>
-            <a:noFill/>
-          </a:ln>
-        </p:spPr>
-        <p:txBody>
-          <a:bodyPr spcFirstLastPara="1" wrap="square" lIns="91425" tIns="45700" rIns="91425" bIns="45700" anchor="ctr" anchorCtr="0">
-            <a:noAutofit/>
-          </a:bodyPr>
-          <a:lstStyle/>
-          <a:p>
-            <a:pPr marL="0" lvl="0" indent="0" algn="r" rtl="0">
-              <a:spcBef>
-                <a:spcPts val="0"/>
-              </a:spcBef>
-              <a:spcAft>
-                <a:spcPts val="0"/>
-              </a:spcAft>
-              <a:buNone/>
-            </a:pPr>
-            <a:fld id="{00000000-1234-1234-1234-123412341234}" type="slidenum">
-              <a:rPr lang="en-US"/>
-              <a:t>9</a:t>
-            </a:fld>
-            <a:endParaRPr/>
-          </a:p>
-        </p:txBody>
-      </p:sp>
-      <p:pic>
-        <p:nvPicPr>
-          <p:cNvPr id="2" name="Picture 1" descr="A blue text on a black background&#10;&#10;AI-generated content may be incorrect.">
-            <a:extLst>
-              <a:ext uri="{FF2B5EF4-FFF2-40B4-BE49-F238E27FC236}">
-                <a16:creationId xmlns:a16="http://schemas.microsoft.com/office/drawing/2014/main" id="{FA33A959-88CF-E665-6C1F-0BCE25E106F2}"/>
-              </a:ext>
-            </a:extLst>
-          </p:cNvPr>
-          <p:cNvPicPr>
-            <a:picLocks noChangeAspect="1"/>
-          </p:cNvPicPr>
-          <p:nvPr/>
-        </p:nvPicPr>
-        <p:blipFill>
-          <a:blip r:embed="rId3"/>
-          <a:stretch>
-            <a:fillRect/>
-          </a:stretch>
-        </p:blipFill>
-        <p:spPr>
-          <a:xfrm>
-            <a:off x="9156273" y="6347222"/>
-            <a:ext cx="1475520" cy="383380"/>
-          </a:xfrm>
-          <a:prstGeom prst="rect">
-            <a:avLst/>
-          </a:prstGeom>
-        </p:spPr>
-      </p:pic>
-      <p:sp>
-        <p:nvSpPr>
-          <p:cNvPr id="4" name="TextBox 3">
-            <a:extLst>
-              <a:ext uri="{FF2B5EF4-FFF2-40B4-BE49-F238E27FC236}">
-                <a16:creationId xmlns:a16="http://schemas.microsoft.com/office/drawing/2014/main" id="{26B59374-E0D6-423C-A813-08E86A08C421}"/>
-              </a:ext>
-            </a:extLst>
-          </p:cNvPr>
-          <p:cNvSpPr txBox="1"/>
-          <p:nvPr/>
-        </p:nvSpPr>
-        <p:spPr>
-          <a:xfrm>
-            <a:off x="838200" y="3275111"/>
-            <a:ext cx="10515600" cy="707886"/>
-          </a:xfrm>
-          <a:prstGeom prst="rect">
-            <a:avLst/>
-          </a:prstGeom>
-          <a:noFill/>
-        </p:spPr>
-        <p:txBody>
-          <a:bodyPr wrap="square" rtlCol="0">
-            <a:spAutoFit/>
-          </a:bodyPr>
-          <a:lstStyle/>
-          <a:p>
-            <a:pPr algn="ctr"/>
-            <a:r>
-              <a:rPr lang="en-US" sz="4000" b="1" dirty="0" err="1"/>
-              <a:t>Mlflow</a:t>
-            </a:r>
-            <a:endParaRPr lang="en-US" sz="4000" b="1" dirty="0"/>
-          </a:p>
-        </p:txBody>
-      </p:sp>
-    </p:spTree>
-    <p:extLst>
-      <p:ext uri="{BB962C8B-B14F-4D97-AF65-F5344CB8AC3E}">
-        <p14:creationId xmlns:p14="http://schemas.microsoft.com/office/powerpoint/2010/main" val="1430579263"/>
-      </p:ext>
-    </p:extLst>
-  </p:cSld>
-  <p:clrMapOvr>
-    <a:masterClrMapping/>
-  </p:clrMapOvr>
-</p:sld>
-</file>
-
 <file path=ppt/theme/theme1.xml><?xml version="1.0" encoding="utf-8"?>
 <a:theme xmlns:a="http://schemas.openxmlformats.org/drawingml/2006/main" name="Office Theme">
   <a:themeElements>

</xml_diff>